<commit_message>
Replace PpGoGreen.pptx, very small changes
</commit_message>
<xml_diff>
--- a/PpGoGreen.pptx
+++ b/PpGoGreen.pptx
@@ -3923,6 +3923,10 @@
           <a:lstStyle/>
           <a:p>
             <a:r>
+              <a:rPr lang="nl-NL" dirty="0"/>
+              <a:t>Application: </a:t>
+            </a:r>
+            <a:r>
               <a:rPr lang="nl-NL" dirty="0" err="1"/>
               <a:t>Stats</a:t>
             </a:r>
@@ -4010,6 +4014,10 @@
           <a:lstStyle/>
           <a:p>
             <a:r>
+              <a:rPr lang="nl-NL" dirty="0"/>
+              <a:t>Application: </a:t>
+            </a:r>
+            <a:r>
               <a:rPr lang="nl-NL" dirty="0" err="1"/>
               <a:t>Achievements</a:t>
             </a:r>
@@ -4098,7 +4106,7 @@
           <a:p>
             <a:r>
               <a:rPr lang="nl-NL" dirty="0"/>
-              <a:t>Personal </a:t>
+              <a:t>Application: Personal </a:t>
             </a:r>
             <a:r>
               <a:rPr lang="nl-NL" dirty="0" err="1"/>

</xml_diff>

<commit_message>
Replace PpGoGreen.pptx, add screenshots to stats, achievements and personal settings
</commit_message>
<xml_diff>
--- a/PpGoGreen.pptx
+++ b/PpGoGreen.pptx
@@ -13,12 +13,11 @@
     <p:sldId id="265" r:id="rId7"/>
     <p:sldId id="266" r:id="rId8"/>
     <p:sldId id="267" r:id="rId9"/>
-    <p:sldId id="268" r:id="rId10"/>
-    <p:sldId id="269" r:id="rId11"/>
-    <p:sldId id="270" r:id="rId12"/>
-    <p:sldId id="271" r:id="rId13"/>
-    <p:sldId id="262" r:id="rId14"/>
-    <p:sldId id="260" r:id="rId15"/>
+    <p:sldId id="274" r:id="rId10"/>
+    <p:sldId id="272" r:id="rId11"/>
+    <p:sldId id="273" r:id="rId12"/>
+    <p:sldId id="262" r:id="rId13"/>
+    <p:sldId id="260" r:id="rId14"/>
   </p:sldIdLst>
   <p:sldSz cx="12192000" cy="6858000"/>
   <p:notesSz cx="6858000" cy="9144000"/>
@@ -3906,7 +3905,7 @@
           <p:cNvPr id="2" name="Titel 1">
             <a:extLst>
               <a:ext uri="{FF2B5EF4-FFF2-40B4-BE49-F238E27FC236}">
-                <a16:creationId xmlns:a16="http://schemas.microsoft.com/office/drawing/2014/main" id="{D3653AB3-74D9-48A3-8638-DEA20C98A545}"/>
+                <a16:creationId xmlns:a16="http://schemas.microsoft.com/office/drawing/2014/main" id="{EB3E916F-0ACC-46AA-928D-91263392B7C1}"/>
               </a:ext>
             </a:extLst>
           </p:cNvPr>
@@ -3928,44 +3927,133 @@
             </a:r>
             <a:r>
               <a:rPr lang="nl-NL" dirty="0" err="1"/>
-              <a:t>Stats</a:t>
+              <a:t>Achievements</a:t>
             </a:r>
             <a:endParaRPr lang="nl-NL" dirty="0"/>
           </a:p>
         </p:txBody>
       </p:sp>
-      <p:sp>
-        <p:nvSpPr>
-          <p:cNvPr id="3" name="Tijdelijke aanduiding voor inhoud 2">
+      <p:pic>
+        <p:nvPicPr>
+          <p:cNvPr id="5" name="Tijdelijke aanduiding voor inhoud 4">
             <a:extLst>
               <a:ext uri="{FF2B5EF4-FFF2-40B4-BE49-F238E27FC236}">
-                <a16:creationId xmlns:a16="http://schemas.microsoft.com/office/drawing/2014/main" id="{9D4B574C-CBE6-4279-846C-0E1BA5AE6266}"/>
+                <a16:creationId xmlns:a16="http://schemas.microsoft.com/office/drawing/2014/main" id="{0E61D48F-FFE6-44FE-82F6-3619B7BC70FC}"/>
               </a:ext>
             </a:extLst>
           </p:cNvPr>
-          <p:cNvSpPr>
-            <a:spLocks noGrp="1"/>
-          </p:cNvSpPr>
+          <p:cNvPicPr>
+            <a:picLocks noGrp="1" noChangeAspect="1"/>
+          </p:cNvPicPr>
           <p:nvPr>
             <p:ph idx="1"/>
           </p:nvPr>
-        </p:nvSpPr>
-        <p:spPr/>
-        <p:txBody>
-          <a:bodyPr/>
-          <a:lstStyle/>
-          <a:p>
-            <a:r>
-              <a:rPr lang="nl-NL" dirty="0"/>
-              <a:t>TBA</a:t>
-            </a:r>
+        </p:nvPicPr>
+        <p:blipFill>
+          <a:blip r:embed="rId2">
+            <a:extLst>
+              <a:ext uri="{28A0092B-C50C-407E-A947-70E740481C1C}">
+                <a14:useLocalDpi xmlns:a14="http://schemas.microsoft.com/office/drawing/2010/main" val="0"/>
+              </a:ext>
+            </a:extLst>
+          </a:blip>
+          <a:stretch>
+            <a:fillRect/>
+          </a:stretch>
+        </p:blipFill>
+        <p:spPr>
+          <a:xfrm>
+            <a:off x="361697" y="2098801"/>
+            <a:ext cx="5378606" cy="3828839"/>
+          </a:xfrm>
+        </p:spPr>
+      </p:pic>
+      <p:pic>
+        <p:nvPicPr>
+          <p:cNvPr id="7" name="Afbeelding 6">
+            <a:extLst>
+              <a:ext uri="{FF2B5EF4-FFF2-40B4-BE49-F238E27FC236}">
+                <a16:creationId xmlns:a16="http://schemas.microsoft.com/office/drawing/2014/main" id="{C56F6D77-C659-41AA-8C8C-2014C37731B8}"/>
+              </a:ext>
+            </a:extLst>
+          </p:cNvPr>
+          <p:cNvPicPr>
+            <a:picLocks noChangeAspect="1"/>
+          </p:cNvPicPr>
+          <p:nvPr/>
+        </p:nvPicPr>
+        <p:blipFill>
+          <a:blip r:embed="rId3">
+            <a:extLst>
+              <a:ext uri="{28A0092B-C50C-407E-A947-70E740481C1C}">
+                <a14:useLocalDpi xmlns:a14="http://schemas.microsoft.com/office/drawing/2010/main" val="0"/>
+              </a:ext>
+            </a:extLst>
+          </a:blip>
+          <a:stretch>
+            <a:fillRect/>
+          </a:stretch>
+        </p:blipFill>
+        <p:spPr>
+          <a:xfrm>
+            <a:off x="6452897" y="2098801"/>
+            <a:ext cx="5378606" cy="3828839"/>
+          </a:xfrm>
+          <a:prstGeom prst="rect">
+            <a:avLst/>
+          </a:prstGeom>
+        </p:spPr>
+      </p:pic>
+      <p:sp>
+        <p:nvSpPr>
+          <p:cNvPr id="8" name="Pijl: rechts 7">
+            <a:extLst>
+              <a:ext uri="{FF2B5EF4-FFF2-40B4-BE49-F238E27FC236}">
+                <a16:creationId xmlns:a16="http://schemas.microsoft.com/office/drawing/2014/main" id="{E80C29C1-6C2E-4D28-AF45-5784854A6D9A}"/>
+              </a:ext>
+            </a:extLst>
+          </p:cNvPr>
+          <p:cNvSpPr/>
+          <p:nvPr/>
+        </p:nvSpPr>
+        <p:spPr>
+          <a:xfrm>
+            <a:off x="5893200" y="3729600"/>
+            <a:ext cx="367549" cy="282072"/>
+          </a:xfrm>
+          <a:prstGeom prst="rightArrow">
+            <a:avLst/>
+          </a:prstGeom>
+        </p:spPr>
+        <p:style>
+          <a:lnRef idx="2">
+            <a:schemeClr val="accent1">
+              <a:shade val="50000"/>
+            </a:schemeClr>
+          </a:lnRef>
+          <a:fillRef idx="1">
+            <a:schemeClr val="accent1"/>
+          </a:fillRef>
+          <a:effectRef idx="0">
+            <a:schemeClr val="accent1"/>
+          </a:effectRef>
+          <a:fontRef idx="minor">
+            <a:schemeClr val="lt1"/>
+          </a:fontRef>
+        </p:style>
+        <p:txBody>
+          <a:bodyPr rtlCol="0" anchor="ctr"/>
+          <a:lstStyle/>
+          <a:p>
+            <a:pPr algn="ctr"/>
+            <a:endParaRPr lang="nl-NL"/>
           </a:p>
         </p:txBody>
       </p:sp>
     </p:spTree>
     <p:extLst>
       <p:ext uri="{BB962C8B-B14F-4D97-AF65-F5344CB8AC3E}">
-        <p14:creationId xmlns:p14="http://schemas.microsoft.com/office/powerpoint/2010/main" val="3794824228"/>
+        <p14:creationId xmlns:p14="http://schemas.microsoft.com/office/powerpoint/2010/main" val="453789496"/>
       </p:ext>
     </p:extLst>
   </p:cSld>
@@ -3997,7 +4085,7 @@
           <p:cNvPr id="2" name="Titel 1">
             <a:extLst>
               <a:ext uri="{FF2B5EF4-FFF2-40B4-BE49-F238E27FC236}">
-                <a16:creationId xmlns:a16="http://schemas.microsoft.com/office/drawing/2014/main" id="{B8D5B061-1486-41C3-8F35-33A5852CF10F}"/>
+                <a16:creationId xmlns:a16="http://schemas.microsoft.com/office/drawing/2014/main" id="{26780B71-3C45-418E-886F-570A65BE1E60}"/>
               </a:ext>
             </a:extLst>
           </p:cNvPr>
@@ -4015,48 +4103,55 @@
           <a:p>
             <a:r>
               <a:rPr lang="nl-NL" dirty="0"/>
-              <a:t>Application: </a:t>
+              <a:t>Application: Personal </a:t>
             </a:r>
             <a:r>
               <a:rPr lang="nl-NL" dirty="0" err="1"/>
-              <a:t>Achievements</a:t>
+              <a:t>settings</a:t>
             </a:r>
             <a:endParaRPr lang="nl-NL" dirty="0"/>
           </a:p>
         </p:txBody>
       </p:sp>
-      <p:sp>
-        <p:nvSpPr>
-          <p:cNvPr id="3" name="Tijdelijke aanduiding voor inhoud 2">
+      <p:pic>
+        <p:nvPicPr>
+          <p:cNvPr id="7" name="Tijdelijke aanduiding voor inhoud 6" descr="Afbeelding met schermafbeelding&#10;&#10;Automatisch gegenereerde beschrijving">
             <a:extLst>
               <a:ext uri="{FF2B5EF4-FFF2-40B4-BE49-F238E27FC236}">
-                <a16:creationId xmlns:a16="http://schemas.microsoft.com/office/drawing/2014/main" id="{5EB278B3-426D-4541-BC27-8650DE435735}"/>
+                <a16:creationId xmlns:a16="http://schemas.microsoft.com/office/drawing/2014/main" id="{CA8BB1D5-C294-4374-A90B-4DF3199F9794}"/>
               </a:ext>
             </a:extLst>
           </p:cNvPr>
-          <p:cNvSpPr>
-            <a:spLocks noGrp="1"/>
-          </p:cNvSpPr>
+          <p:cNvPicPr>
+            <a:picLocks noGrp="1" noChangeAspect="1"/>
+          </p:cNvPicPr>
           <p:nvPr>
             <p:ph idx="1"/>
           </p:nvPr>
-        </p:nvSpPr>
-        <p:spPr/>
-        <p:txBody>
-          <a:bodyPr/>
-          <a:lstStyle/>
-          <a:p>
-            <a:r>
-              <a:rPr lang="nl-NL" dirty="0"/>
-              <a:t>TBA</a:t>
-            </a:r>
-          </a:p>
-        </p:txBody>
-      </p:sp>
+        </p:nvPicPr>
+        <p:blipFill>
+          <a:blip r:embed="rId2">
+            <a:extLst>
+              <a:ext uri="{28A0092B-C50C-407E-A947-70E740481C1C}">
+                <a14:useLocalDpi xmlns:a14="http://schemas.microsoft.com/office/drawing/2010/main" val="0"/>
+              </a:ext>
+            </a:extLst>
+          </a:blip>
+          <a:stretch>
+            <a:fillRect/>
+          </a:stretch>
+        </p:blipFill>
+        <p:spPr>
+          <a:xfrm>
+            <a:off x="3300678" y="1846263"/>
+            <a:ext cx="5650970" cy="4022725"/>
+          </a:xfrm>
+        </p:spPr>
+      </p:pic>
     </p:spTree>
     <p:extLst>
       <p:ext uri="{BB962C8B-B14F-4D97-AF65-F5344CB8AC3E}">
-        <p14:creationId xmlns:p14="http://schemas.microsoft.com/office/powerpoint/2010/main" val="1066486424"/>
+        <p14:creationId xmlns:p14="http://schemas.microsoft.com/office/powerpoint/2010/main" val="2848107030"/>
       </p:ext>
     </p:extLst>
   </p:cSld>
@@ -4088,102 +4183,6 @@
           <p:cNvPr id="2" name="Titel 1">
             <a:extLst>
               <a:ext uri="{FF2B5EF4-FFF2-40B4-BE49-F238E27FC236}">
-                <a16:creationId xmlns:a16="http://schemas.microsoft.com/office/drawing/2014/main" id="{A01CC68B-A689-441F-A7BE-40B6D30ADE27}"/>
-              </a:ext>
-            </a:extLst>
-          </p:cNvPr>
-          <p:cNvSpPr>
-            <a:spLocks noGrp="1"/>
-          </p:cNvSpPr>
-          <p:nvPr>
-            <p:ph type="title"/>
-          </p:nvPr>
-        </p:nvSpPr>
-        <p:spPr/>
-        <p:txBody>
-          <a:bodyPr/>
-          <a:lstStyle/>
-          <a:p>
-            <a:r>
-              <a:rPr lang="nl-NL" dirty="0"/>
-              <a:t>Application: Personal </a:t>
-            </a:r>
-            <a:r>
-              <a:rPr lang="nl-NL" dirty="0" err="1"/>
-              <a:t>Settings</a:t>
-            </a:r>
-            <a:endParaRPr lang="nl-NL" dirty="0"/>
-          </a:p>
-        </p:txBody>
-      </p:sp>
-      <p:sp>
-        <p:nvSpPr>
-          <p:cNvPr id="3" name="Tijdelijke aanduiding voor inhoud 2">
-            <a:extLst>
-              <a:ext uri="{FF2B5EF4-FFF2-40B4-BE49-F238E27FC236}">
-                <a16:creationId xmlns:a16="http://schemas.microsoft.com/office/drawing/2014/main" id="{7D21870A-5FA9-4216-8569-78C50FF6E752}"/>
-              </a:ext>
-            </a:extLst>
-          </p:cNvPr>
-          <p:cNvSpPr>
-            <a:spLocks noGrp="1"/>
-          </p:cNvSpPr>
-          <p:nvPr>
-            <p:ph idx="1"/>
-          </p:nvPr>
-        </p:nvSpPr>
-        <p:spPr/>
-        <p:txBody>
-          <a:bodyPr>
-            <a:normAutofit/>
-          </a:bodyPr>
-          <a:lstStyle/>
-          <a:p>
-            <a:pPr marL="0" indent="0">
-              <a:buNone/>
-            </a:pPr>
-            <a:r>
-              <a:rPr lang="nl-NL" sz="2800" dirty="0"/>
-              <a:t>TBA</a:t>
-            </a:r>
-          </a:p>
-        </p:txBody>
-      </p:sp>
-    </p:spTree>
-    <p:extLst>
-      <p:ext uri="{BB962C8B-B14F-4D97-AF65-F5344CB8AC3E}">
-        <p14:creationId xmlns:p14="http://schemas.microsoft.com/office/powerpoint/2010/main" val="1656238497"/>
-      </p:ext>
-    </p:extLst>
-  </p:cSld>
-  <p:clrMapOvr>
-    <a:masterClrMapping/>
-  </p:clrMapOvr>
-</p:sld>
-</file>
-
-<file path=ppt/slides/slide13.xml><?xml version="1.0" encoding="utf-8"?>
-<p:sld xmlns:a="http://schemas.openxmlformats.org/drawingml/2006/main" xmlns:r="http://schemas.openxmlformats.org/officeDocument/2006/relationships" xmlns:p="http://schemas.openxmlformats.org/presentationml/2006/main">
-  <p:cSld>
-    <p:spTree>
-      <p:nvGrpSpPr>
-        <p:cNvPr id="1" name=""/>
-        <p:cNvGrpSpPr/>
-        <p:nvPr/>
-      </p:nvGrpSpPr>
-      <p:grpSpPr>
-        <a:xfrm>
-          <a:off x="0" y="0"/>
-          <a:ext cx="0" cy="0"/>
-          <a:chOff x="0" y="0"/>
-          <a:chExt cx="0" cy="0"/>
-        </a:xfrm>
-      </p:grpSpPr>
-      <p:sp>
-        <p:nvSpPr>
-          <p:cNvPr id="2" name="Titel 1">
-            <a:extLst>
-              <a:ext uri="{FF2B5EF4-FFF2-40B4-BE49-F238E27FC236}">
                 <a16:creationId xmlns:a16="http://schemas.microsoft.com/office/drawing/2014/main" id="{8E20936B-BCB4-4481-96BC-743080ADC59E}"/>
               </a:ext>
             </a:extLst>
@@ -4264,7 +4263,7 @@
                 </a:solidFill>
                 <a:cs typeface="Calibri" panose="020F0502020204030204"/>
               </a:rPr>
-              <a:t>Example</a:t>
+              <a:t>Hashed</a:t>
             </a:r>
             <a:r>
               <a:rPr lang="nl-NL" sz="2800" dirty="0">
@@ -4276,17 +4275,8 @@
                 </a:solidFill>
                 <a:cs typeface="Calibri" panose="020F0502020204030204"/>
               </a:rPr>
-              <a:t> 1</a:t>
-            </a:r>
-          </a:p>
-          <a:p>
-            <a:pPr lvl="0">
-              <a:buClr>
-                <a:srgbClr val="99CB38"/>
-              </a:buClr>
-              <a:buFont typeface="Arial" panose="020F0502020204030204" pitchFamily="34" charset="0"/>
-              <a:buChar char="•"/>
-            </a:pPr>
+              <a:t> </a:t>
+            </a:r>
             <a:r>
               <a:rPr lang="nl-NL" sz="2800" dirty="0" err="1">
                 <a:solidFill>
@@ -4297,7 +4287,37 @@
                 </a:solidFill>
                 <a:cs typeface="Calibri" panose="020F0502020204030204"/>
               </a:rPr>
-              <a:t>Example</a:t>
+              <a:t>passwords</a:t>
+            </a:r>
+            <a:endParaRPr lang="nl-NL" sz="2800" dirty="0">
+              <a:solidFill>
+                <a:prstClr val="black">
+                  <a:lumMod val="75000"/>
+                  <a:lumOff val="25000"/>
+                </a:prstClr>
+              </a:solidFill>
+              <a:cs typeface="Calibri" panose="020F0502020204030204"/>
+            </a:endParaRPr>
+          </a:p>
+          <a:p>
+            <a:pPr lvl="0">
+              <a:buClr>
+                <a:srgbClr val="99CB38"/>
+              </a:buClr>
+              <a:buFont typeface="Arial" panose="020F0502020204030204" pitchFamily="34" charset="0"/>
+              <a:buChar char="•"/>
+            </a:pPr>
+            <a:r>
+              <a:rPr lang="nl-NL" sz="2800" dirty="0" err="1">
+                <a:solidFill>
+                  <a:prstClr val="black">
+                    <a:lumMod val="75000"/>
+                    <a:lumOff val="25000"/>
+                  </a:prstClr>
+                </a:solidFill>
+                <a:cs typeface="Calibri" panose="020F0502020204030204"/>
+              </a:rPr>
+              <a:t>Prepared</a:t>
             </a:r>
             <a:r>
               <a:rPr lang="nl-NL" sz="2800" dirty="0">
@@ -4309,7 +4329,7 @@
                 </a:solidFill>
                 <a:cs typeface="Calibri" panose="020F0502020204030204"/>
               </a:rPr>
-              <a:t> 2</a:t>
+              <a:t> statement</a:t>
             </a:r>
             <a:endParaRPr lang="nl-NL" sz="2800" dirty="0">
               <a:solidFill>
@@ -4328,6 +4348,18 @@
               <a:buFont typeface="Arial" panose="020F0502020204030204" pitchFamily="34" charset="0"/>
               <a:buChar char="•"/>
             </a:pPr>
+            <a:r>
+              <a:rPr lang="nl-NL" sz="2800" dirty="0">
+                <a:solidFill>
+                  <a:prstClr val="black">
+                    <a:lumMod val="75000"/>
+                    <a:lumOff val="25000"/>
+                  </a:prstClr>
+                </a:solidFill>
+                <a:cs typeface="Calibri" panose="020F0502020204030204"/>
+              </a:rPr>
+              <a:t>Input </a:t>
+            </a:r>
             <a:r>
               <a:rPr lang="nl-NL" sz="2800" dirty="0" err="1">
                 <a:solidFill>
@@ -4338,42 +4370,17 @@
                 </a:solidFill>
                 <a:cs typeface="Calibri" panose="020F0502020204030204"/>
               </a:rPr>
-              <a:t>Example</a:t>
-            </a:r>
-            <a:r>
-              <a:rPr lang="nl-NL" sz="2800" dirty="0">
-                <a:solidFill>
-                  <a:prstClr val="black">
-                    <a:lumMod val="75000"/>
-                    <a:lumOff val="25000"/>
-                  </a:prstClr>
-                </a:solidFill>
-                <a:cs typeface="Calibri" panose="020F0502020204030204"/>
-              </a:rPr>
-              <a:t> 3</a:t>
-            </a:r>
-          </a:p>
-          <a:p>
-            <a:pPr lvl="0">
-              <a:buClr>
-                <a:srgbClr val="99CB38"/>
-              </a:buClr>
-              <a:buFont typeface="Arial" panose="020F0502020204030204" pitchFamily="34" charset="0"/>
-              <a:buChar char="•"/>
-            </a:pPr>
-            <a:r>
-              <a:rPr lang="nl-NL" sz="2800" dirty="0" err="1">
-                <a:solidFill>
-                  <a:prstClr val="black">
-                    <a:lumMod val="75000"/>
-                    <a:lumOff val="25000"/>
-                  </a:prstClr>
-                </a:solidFill>
-                <a:cs typeface="Calibri" panose="020F0502020204030204"/>
-              </a:rPr>
-              <a:t>Etc</a:t>
-            </a:r>
-            <a:endParaRPr lang="en-GB" dirty="0"/>
+              <a:t>validation</a:t>
+            </a:r>
+            <a:endParaRPr lang="nl-NL" sz="2800" dirty="0">
+              <a:solidFill>
+                <a:prstClr val="black">
+                  <a:lumMod val="75000"/>
+                  <a:lumOff val="25000"/>
+                </a:prstClr>
+              </a:solidFill>
+              <a:cs typeface="Calibri" panose="020F0502020204030204"/>
+            </a:endParaRPr>
           </a:p>
         </p:txBody>
       </p:sp>
@@ -4390,7 +4397,7 @@
 </p:sld>
 </file>
 
-<file path=ppt/slides/slide14.xml><?xml version="1.0" encoding="utf-8"?>
+<file path=ppt/slides/slide13.xml><?xml version="1.0" encoding="utf-8"?>
 <p:sld xmlns:a="http://schemas.openxmlformats.org/drawingml/2006/main" xmlns:r="http://schemas.openxmlformats.org/officeDocument/2006/relationships" xmlns:p="http://schemas.openxmlformats.org/presentationml/2006/main">
   <p:cSld>
     <p:spTree>
@@ -5926,7 +5933,7 @@
           <p:cNvPr id="2" name="Titel 1">
             <a:extLst>
               <a:ext uri="{FF2B5EF4-FFF2-40B4-BE49-F238E27FC236}">
-                <a16:creationId xmlns:a16="http://schemas.microsoft.com/office/drawing/2014/main" id="{EB3E916F-0ACC-46AA-928D-91263392B7C1}"/>
+                <a16:creationId xmlns:a16="http://schemas.microsoft.com/office/drawing/2014/main" id="{26780B71-3C45-418E-886F-570A65BE1E60}"/>
               </a:ext>
             </a:extLst>
           </p:cNvPr>
@@ -5944,17 +5951,22 @@
           <a:p>
             <a:r>
               <a:rPr lang="nl-NL" dirty="0"/>
-              <a:t>Application: Solar Panels</a:t>
-            </a:r>
+              <a:t>Application: </a:t>
+            </a:r>
+            <a:r>
+              <a:rPr lang="nl-NL" dirty="0" err="1"/>
+              <a:t>Stats</a:t>
+            </a:r>
+            <a:endParaRPr lang="nl-NL" dirty="0"/>
           </a:p>
         </p:txBody>
       </p:sp>
       <p:pic>
         <p:nvPicPr>
-          <p:cNvPr id="5" name="Tijdelijke aanduiding voor inhoud 4">
+          <p:cNvPr id="7" name="Tijdelijke aanduiding voor inhoud 6">
             <a:extLst>
               <a:ext uri="{FF2B5EF4-FFF2-40B4-BE49-F238E27FC236}">
-                <a16:creationId xmlns:a16="http://schemas.microsoft.com/office/drawing/2014/main" id="{0E61D48F-FFE6-44FE-82F6-3619B7BC70FC}"/>
+                <a16:creationId xmlns:a16="http://schemas.microsoft.com/office/drawing/2014/main" id="{CA8BB1D5-C294-4374-A90B-4DF3199F9794}"/>
               </a:ext>
             </a:extLst>
           </p:cNvPr>
@@ -5979,97 +5991,15 @@
         </p:blipFill>
         <p:spPr>
           <a:xfrm>
-            <a:off x="356400" y="2098801"/>
-            <a:ext cx="5389200" cy="3828839"/>
+            <a:off x="3300678" y="1846263"/>
+            <a:ext cx="5650970" cy="4022724"/>
           </a:xfrm>
         </p:spPr>
       </p:pic>
-      <p:pic>
-        <p:nvPicPr>
-          <p:cNvPr id="7" name="Afbeelding 6">
-            <a:extLst>
-              <a:ext uri="{FF2B5EF4-FFF2-40B4-BE49-F238E27FC236}">
-                <a16:creationId xmlns:a16="http://schemas.microsoft.com/office/drawing/2014/main" id="{C56F6D77-C659-41AA-8C8C-2014C37731B8}"/>
-              </a:ext>
-            </a:extLst>
-          </p:cNvPr>
-          <p:cNvPicPr>
-            <a:picLocks noChangeAspect="1"/>
-          </p:cNvPicPr>
-          <p:nvPr/>
-        </p:nvPicPr>
-        <p:blipFill>
-          <a:blip r:embed="rId3">
-            <a:extLst>
-              <a:ext uri="{28A0092B-C50C-407E-A947-70E740481C1C}">
-                <a14:useLocalDpi xmlns:a14="http://schemas.microsoft.com/office/drawing/2010/main" val="0"/>
-              </a:ext>
-            </a:extLst>
-          </a:blip>
-          <a:stretch>
-            <a:fillRect/>
-          </a:stretch>
-        </p:blipFill>
-        <p:spPr>
-          <a:xfrm>
-            <a:off x="6447600" y="2098801"/>
-            <a:ext cx="5389200" cy="3828839"/>
-          </a:xfrm>
-          <a:prstGeom prst="rect">
-            <a:avLst/>
-          </a:prstGeom>
-        </p:spPr>
-      </p:pic>
-      <p:sp>
-        <p:nvSpPr>
-          <p:cNvPr id="8" name="Pijl: rechts 7">
-            <a:extLst>
-              <a:ext uri="{FF2B5EF4-FFF2-40B4-BE49-F238E27FC236}">
-                <a16:creationId xmlns:a16="http://schemas.microsoft.com/office/drawing/2014/main" id="{E80C29C1-6C2E-4D28-AF45-5784854A6D9A}"/>
-              </a:ext>
-            </a:extLst>
-          </p:cNvPr>
-          <p:cNvSpPr/>
-          <p:nvPr/>
-        </p:nvSpPr>
-        <p:spPr>
-          <a:xfrm>
-            <a:off x="5893200" y="3729600"/>
-            <a:ext cx="367549" cy="282072"/>
-          </a:xfrm>
-          <a:prstGeom prst="rightArrow">
-            <a:avLst/>
-          </a:prstGeom>
-        </p:spPr>
-        <p:style>
-          <a:lnRef idx="2">
-            <a:schemeClr val="accent1">
-              <a:shade val="50000"/>
-            </a:schemeClr>
-          </a:lnRef>
-          <a:fillRef idx="1">
-            <a:schemeClr val="accent1"/>
-          </a:fillRef>
-          <a:effectRef idx="0">
-            <a:schemeClr val="accent1"/>
-          </a:effectRef>
-          <a:fontRef idx="minor">
-            <a:schemeClr val="lt1"/>
-          </a:fontRef>
-        </p:style>
-        <p:txBody>
-          <a:bodyPr rtlCol="0" anchor="ctr"/>
-          <a:lstStyle/>
-          <a:p>
-            <a:pPr algn="ctr"/>
-            <a:endParaRPr lang="nl-NL"/>
-          </a:p>
-        </p:txBody>
-      </p:sp>
     </p:spTree>
     <p:extLst>
       <p:ext uri="{BB962C8B-B14F-4D97-AF65-F5344CB8AC3E}">
-        <p14:creationId xmlns:p14="http://schemas.microsoft.com/office/powerpoint/2010/main" val="2084172495"/>
+        <p14:creationId xmlns:p14="http://schemas.microsoft.com/office/powerpoint/2010/main" val="290353710"/>
       </p:ext>
     </p:extLst>
   </p:cSld>

</xml_diff>

<commit_message>
Replace PpGoGreen.pptx,added screenshots to Homescreen slide
</commit_message>
<xml_diff>
--- a/PpGoGreen.pptx
+++ b/PpGoGreen.pptx
@@ -4816,20 +4816,85 @@
             </a:endParaRPr>
           </a:p>
           <a:p>
-            <a:pPr>
-              <a:buFont typeface="Arial" panose="020F0502020204030204" pitchFamily="34" charset="0"/>
-              <a:buChar char="•"/>
+            <a:pPr marL="0" indent="0">
+              <a:buNone/>
             </a:pPr>
-            <a:r>
-              <a:rPr lang="nl-NL" sz="2800" dirty="0">
-                <a:cs typeface="Calibri"/>
-              </a:rPr>
-              <a:t>TBA </a:t>
-            </a:r>
             <a:endParaRPr lang="nl-NL" dirty="0"/>
           </a:p>
         </p:txBody>
       </p:sp>
+      <p:pic>
+        <p:nvPicPr>
+          <p:cNvPr id="5" name="Afbeelding 4">
+            <a:extLst>
+              <a:ext uri="{FF2B5EF4-FFF2-40B4-BE49-F238E27FC236}">
+                <a16:creationId xmlns:a16="http://schemas.microsoft.com/office/drawing/2014/main" id="{8258EF45-27DD-4191-B4BE-6749D6CED363}"/>
+              </a:ext>
+            </a:extLst>
+          </p:cNvPr>
+          <p:cNvPicPr>
+            <a:picLocks noChangeAspect="1"/>
+          </p:cNvPicPr>
+          <p:nvPr/>
+        </p:nvPicPr>
+        <p:blipFill>
+          <a:blip r:embed="rId2">
+            <a:extLst>
+              <a:ext uri="{28A0092B-C50C-407E-A947-70E740481C1C}">
+                <a14:useLocalDpi xmlns:a14="http://schemas.microsoft.com/office/drawing/2010/main" val="0"/>
+              </a:ext>
+            </a:extLst>
+          </a:blip>
+          <a:stretch>
+            <a:fillRect/>
+          </a:stretch>
+        </p:blipFill>
+        <p:spPr>
+          <a:xfrm>
+            <a:off x="465456" y="2142915"/>
+            <a:ext cx="5369778" cy="3776889"/>
+          </a:xfrm>
+          <a:prstGeom prst="rect">
+            <a:avLst/>
+          </a:prstGeom>
+        </p:spPr>
+      </p:pic>
+      <p:pic>
+        <p:nvPicPr>
+          <p:cNvPr id="9" name="Afbeelding 8">
+            <a:extLst>
+              <a:ext uri="{FF2B5EF4-FFF2-40B4-BE49-F238E27FC236}">
+                <a16:creationId xmlns:a16="http://schemas.microsoft.com/office/drawing/2014/main" id="{DE0BF763-D63F-421D-976B-092DEF6E3244}"/>
+              </a:ext>
+            </a:extLst>
+          </p:cNvPr>
+          <p:cNvPicPr>
+            <a:picLocks noChangeAspect="1"/>
+          </p:cNvPicPr>
+          <p:nvPr/>
+        </p:nvPicPr>
+        <p:blipFill>
+          <a:blip r:embed="rId3">
+            <a:extLst>
+              <a:ext uri="{28A0092B-C50C-407E-A947-70E740481C1C}">
+                <a14:useLocalDpi xmlns:a14="http://schemas.microsoft.com/office/drawing/2010/main" val="0"/>
+              </a:ext>
+            </a:extLst>
+          </a:blip>
+          <a:stretch>
+            <a:fillRect/>
+          </a:stretch>
+        </p:blipFill>
+        <p:spPr>
+          <a:xfrm>
+            <a:off x="6356768" y="2142915"/>
+            <a:ext cx="5360947" cy="3776889"/>
+          </a:xfrm>
+          <a:prstGeom prst="rect">
+            <a:avLst/>
+          </a:prstGeom>
+        </p:spPr>
+      </p:pic>
     </p:spTree>
     <p:extLst>
       <p:ext uri="{BB962C8B-B14F-4D97-AF65-F5344CB8AC3E}">

</xml_diff>

<commit_message>
Replace PpGoGreen.pptx, added solar panel slide
</commit_message>
<xml_diff>
--- a/PpGoGreen.pptx
+++ b/PpGoGreen.pptx
@@ -8,16 +8,18 @@
     <p:sldId id="256" r:id="rId2"/>
     <p:sldId id="258" r:id="rId3"/>
     <p:sldId id="259" r:id="rId4"/>
-    <p:sldId id="263" r:id="rId5"/>
-    <p:sldId id="264" r:id="rId6"/>
-    <p:sldId id="265" r:id="rId7"/>
-    <p:sldId id="266" r:id="rId8"/>
-    <p:sldId id="267" r:id="rId9"/>
-    <p:sldId id="274" r:id="rId10"/>
-    <p:sldId id="272" r:id="rId11"/>
-    <p:sldId id="273" r:id="rId12"/>
-    <p:sldId id="262" r:id="rId13"/>
-    <p:sldId id="260" r:id="rId14"/>
+    <p:sldId id="276" r:id="rId5"/>
+    <p:sldId id="263" r:id="rId6"/>
+    <p:sldId id="264" r:id="rId7"/>
+    <p:sldId id="265" r:id="rId8"/>
+    <p:sldId id="266" r:id="rId9"/>
+    <p:sldId id="267" r:id="rId10"/>
+    <p:sldId id="275" r:id="rId11"/>
+    <p:sldId id="274" r:id="rId12"/>
+    <p:sldId id="272" r:id="rId13"/>
+    <p:sldId id="273" r:id="rId14"/>
+    <p:sldId id="262" r:id="rId15"/>
+    <p:sldId id="260" r:id="rId16"/>
   </p:sldIdLst>
   <p:sldSz cx="12192000" cy="6858000"/>
   <p:notesSz cx="6858000" cy="9144000"/>
@@ -350,7 +352,7 @@
           <a:p>
             <a:fld id="{CA953BDC-9EAE-49FE-9892-958C9F845175}" type="datetimeFigureOut">
               <a:rPr lang="de-DE" smtClean="0"/>
-              <a:t>14.04.2019</a:t>
+              <a:t>15.04.2019</a:t>
             </a:fld>
             <a:endParaRPr lang="de-DE"/>
           </a:p>
@@ -558,7 +560,7 @@
           <a:p>
             <a:fld id="{CA953BDC-9EAE-49FE-9892-958C9F845175}" type="datetimeFigureOut">
               <a:rPr lang="de-DE" smtClean="0"/>
-              <a:t>14.04.2019</a:t>
+              <a:t>15.04.2019</a:t>
             </a:fld>
             <a:endParaRPr lang="de-DE"/>
           </a:p>
@@ -814,7 +816,7 @@
           <a:p>
             <a:fld id="{CA953BDC-9EAE-49FE-9892-958C9F845175}" type="datetimeFigureOut">
               <a:rPr lang="de-DE" smtClean="0"/>
-              <a:t>14.04.2019</a:t>
+              <a:t>15.04.2019</a:t>
             </a:fld>
             <a:endParaRPr lang="de-DE"/>
           </a:p>
@@ -984,7 +986,7 @@
           <a:p>
             <a:fld id="{CA953BDC-9EAE-49FE-9892-958C9F845175}" type="datetimeFigureOut">
               <a:rPr lang="de-DE" smtClean="0"/>
-              <a:t>14.04.2019</a:t>
+              <a:t>15.04.2019</a:t>
             </a:fld>
             <a:endParaRPr lang="de-DE"/>
           </a:p>
@@ -1327,7 +1329,7 @@
           <a:p>
             <a:fld id="{CA953BDC-9EAE-49FE-9892-958C9F845175}" type="datetimeFigureOut">
               <a:rPr lang="de-DE" smtClean="0"/>
-              <a:t>14.04.2019</a:t>
+              <a:t>15.04.2019</a:t>
             </a:fld>
             <a:endParaRPr lang="de-DE"/>
           </a:p>
@@ -1602,7 +1604,7 @@
           <a:p>
             <a:fld id="{CA953BDC-9EAE-49FE-9892-958C9F845175}" type="datetimeFigureOut">
               <a:rPr lang="de-DE" smtClean="0"/>
-              <a:t>14.04.2019</a:t>
+              <a:t>15.04.2019</a:t>
             </a:fld>
             <a:endParaRPr lang="de-DE"/>
           </a:p>
@@ -1981,7 +1983,7 @@
           <a:p>
             <a:fld id="{CA953BDC-9EAE-49FE-9892-958C9F845175}" type="datetimeFigureOut">
               <a:rPr lang="de-DE" smtClean="0"/>
-              <a:t>14.04.2019</a:t>
+              <a:t>15.04.2019</a:t>
             </a:fld>
             <a:endParaRPr lang="de-DE"/>
           </a:p>
@@ -2099,7 +2101,7 @@
           <a:p>
             <a:fld id="{CA953BDC-9EAE-49FE-9892-958C9F845175}" type="datetimeFigureOut">
               <a:rPr lang="de-DE" smtClean="0"/>
-              <a:t>14.04.2019</a:t>
+              <a:t>15.04.2019</a:t>
             </a:fld>
             <a:endParaRPr lang="de-DE"/>
           </a:p>
@@ -2270,7 +2272,7 @@
           <a:p>
             <a:fld id="{CA953BDC-9EAE-49FE-9892-958C9F845175}" type="datetimeFigureOut">
               <a:rPr lang="de-DE" smtClean="0"/>
-              <a:t>14.04.2019</a:t>
+              <a:t>15.04.2019</a:t>
             </a:fld>
             <a:endParaRPr lang="de-DE"/>
           </a:p>
@@ -2624,7 +2626,7 @@
           <a:p>
             <a:fld id="{CA953BDC-9EAE-49FE-9892-958C9F845175}" type="datetimeFigureOut">
               <a:rPr lang="de-DE" smtClean="0"/>
-              <a:t>14.04.2019</a:t>
+              <a:t>15.04.2019</a:t>
             </a:fld>
             <a:endParaRPr lang="de-DE"/>
           </a:p>
@@ -3001,7 +3003,7 @@
           <a:p>
             <a:fld id="{CA953BDC-9EAE-49FE-9892-958C9F845175}" type="datetimeFigureOut">
               <a:rPr lang="de-DE" smtClean="0"/>
-              <a:t>14.04.2019</a:t>
+              <a:t>15.04.2019</a:t>
             </a:fld>
             <a:endParaRPr lang="de-DE"/>
           </a:p>
@@ -3288,7 +3290,7 @@
           <a:p>
             <a:fld id="{CA953BDC-9EAE-49FE-9892-958C9F845175}" type="datetimeFigureOut">
               <a:rPr lang="de-DE" smtClean="0"/>
-              <a:t>14.04.2019</a:t>
+              <a:t>15.04.2019</a:t>
             </a:fld>
             <a:endParaRPr lang="de-DE"/>
           </a:p>
@@ -3905,6 +3907,279 @@
           <p:cNvPr id="2" name="Titel 1">
             <a:extLst>
               <a:ext uri="{FF2B5EF4-FFF2-40B4-BE49-F238E27FC236}">
+                <a16:creationId xmlns:a16="http://schemas.microsoft.com/office/drawing/2014/main" id="{965D687A-407E-4F74-AD24-357F7F993CD5}"/>
+              </a:ext>
+            </a:extLst>
+          </p:cNvPr>
+          <p:cNvSpPr>
+            <a:spLocks noGrp="1"/>
+          </p:cNvSpPr>
+          <p:nvPr>
+            <p:ph type="title"/>
+          </p:nvPr>
+        </p:nvSpPr>
+        <p:spPr/>
+        <p:txBody>
+          <a:bodyPr/>
+          <a:lstStyle/>
+          <a:p>
+            <a:r>
+              <a:rPr lang="nl-NL" dirty="0"/>
+              <a:t>Application: Solar Panels</a:t>
+            </a:r>
+          </a:p>
+        </p:txBody>
+      </p:sp>
+      <p:pic>
+        <p:nvPicPr>
+          <p:cNvPr id="5" name="Tijdelijke aanduiding voor inhoud 4">
+            <a:extLst>
+              <a:ext uri="{FF2B5EF4-FFF2-40B4-BE49-F238E27FC236}">
+                <a16:creationId xmlns:a16="http://schemas.microsoft.com/office/drawing/2014/main" id="{E350BE6F-C3A5-43F7-872C-2C60605CAAD8}"/>
+              </a:ext>
+            </a:extLst>
+          </p:cNvPr>
+          <p:cNvPicPr>
+            <a:picLocks noGrp="1" noChangeAspect="1"/>
+          </p:cNvPicPr>
+          <p:nvPr>
+            <p:ph idx="1"/>
+          </p:nvPr>
+        </p:nvPicPr>
+        <p:blipFill>
+          <a:blip r:embed="rId2">
+            <a:extLst>
+              <a:ext uri="{28A0092B-C50C-407E-A947-70E740481C1C}">
+                <a14:useLocalDpi xmlns:a14="http://schemas.microsoft.com/office/drawing/2010/main" val="0"/>
+              </a:ext>
+            </a:extLst>
+          </a:blip>
+          <a:stretch>
+            <a:fillRect/>
+          </a:stretch>
+        </p:blipFill>
+        <p:spPr>
+          <a:xfrm>
+            <a:off x="356400" y="2098800"/>
+            <a:ext cx="5389200" cy="3828839"/>
+          </a:xfrm>
+        </p:spPr>
+      </p:pic>
+      <p:pic>
+        <p:nvPicPr>
+          <p:cNvPr id="7" name="Afbeelding 6">
+            <a:extLst>
+              <a:ext uri="{FF2B5EF4-FFF2-40B4-BE49-F238E27FC236}">
+                <a16:creationId xmlns:a16="http://schemas.microsoft.com/office/drawing/2014/main" id="{FAFCD199-8B4D-4775-A1AC-E263DDA43E82}"/>
+              </a:ext>
+            </a:extLst>
+          </p:cNvPr>
+          <p:cNvPicPr>
+            <a:picLocks noChangeAspect="1"/>
+          </p:cNvPicPr>
+          <p:nvPr/>
+        </p:nvPicPr>
+        <p:blipFill>
+          <a:blip r:embed="rId3">
+            <a:extLst>
+              <a:ext uri="{28A0092B-C50C-407E-A947-70E740481C1C}">
+                <a14:useLocalDpi xmlns:a14="http://schemas.microsoft.com/office/drawing/2010/main" val="0"/>
+              </a:ext>
+            </a:extLst>
+          </a:blip>
+          <a:stretch>
+            <a:fillRect/>
+          </a:stretch>
+        </p:blipFill>
+        <p:spPr>
+          <a:xfrm>
+            <a:off x="6447600" y="2098800"/>
+            <a:ext cx="5389200" cy="3828838"/>
+          </a:xfrm>
+          <a:prstGeom prst="rect">
+            <a:avLst/>
+          </a:prstGeom>
+        </p:spPr>
+      </p:pic>
+      <p:sp>
+        <p:nvSpPr>
+          <p:cNvPr id="8" name="Pijl: rechts 7">
+            <a:extLst>
+              <a:ext uri="{FF2B5EF4-FFF2-40B4-BE49-F238E27FC236}">
+                <a16:creationId xmlns:a16="http://schemas.microsoft.com/office/drawing/2014/main" id="{0ECCBC12-ACE4-4CC4-A9DE-E4C69AAD5515}"/>
+              </a:ext>
+            </a:extLst>
+          </p:cNvPr>
+          <p:cNvSpPr/>
+          <p:nvPr/>
+        </p:nvSpPr>
+        <p:spPr>
+          <a:xfrm>
+            <a:off x="5893200" y="3729600"/>
+            <a:ext cx="367549" cy="282072"/>
+          </a:xfrm>
+          <a:prstGeom prst="rightArrow">
+            <a:avLst/>
+          </a:prstGeom>
+        </p:spPr>
+        <p:style>
+          <a:lnRef idx="2">
+            <a:schemeClr val="accent1">
+              <a:shade val="50000"/>
+            </a:schemeClr>
+          </a:lnRef>
+          <a:fillRef idx="1">
+            <a:schemeClr val="accent1"/>
+          </a:fillRef>
+          <a:effectRef idx="0">
+            <a:schemeClr val="accent1"/>
+          </a:effectRef>
+          <a:fontRef idx="minor">
+            <a:schemeClr val="lt1"/>
+          </a:fontRef>
+        </p:style>
+        <p:txBody>
+          <a:bodyPr rtlCol="0" anchor="ctr"/>
+          <a:lstStyle/>
+          <a:p>
+            <a:pPr algn="ctr"/>
+            <a:endParaRPr lang="nl-NL"/>
+          </a:p>
+        </p:txBody>
+      </p:sp>
+    </p:spTree>
+    <p:extLst>
+      <p:ext uri="{BB962C8B-B14F-4D97-AF65-F5344CB8AC3E}">
+        <p14:creationId xmlns:p14="http://schemas.microsoft.com/office/powerpoint/2010/main" val="1028707553"/>
+      </p:ext>
+    </p:extLst>
+  </p:cSld>
+  <p:clrMapOvr>
+    <a:masterClrMapping/>
+  </p:clrMapOvr>
+</p:sld>
+</file>
+
+<file path=ppt/slides/slide11.xml><?xml version="1.0" encoding="utf-8"?>
+<p:sld xmlns:a="http://schemas.openxmlformats.org/drawingml/2006/main" xmlns:r="http://schemas.openxmlformats.org/officeDocument/2006/relationships" xmlns:p="http://schemas.openxmlformats.org/presentationml/2006/main">
+  <p:cSld>
+    <p:spTree>
+      <p:nvGrpSpPr>
+        <p:cNvPr id="1" name=""/>
+        <p:cNvGrpSpPr/>
+        <p:nvPr/>
+      </p:nvGrpSpPr>
+      <p:grpSpPr>
+        <a:xfrm>
+          <a:off x="0" y="0"/>
+          <a:ext cx="0" cy="0"/>
+          <a:chOff x="0" y="0"/>
+          <a:chExt cx="0" cy="0"/>
+        </a:xfrm>
+      </p:grpSpPr>
+      <p:sp>
+        <p:nvSpPr>
+          <p:cNvPr id="2" name="Titel 1">
+            <a:extLst>
+              <a:ext uri="{FF2B5EF4-FFF2-40B4-BE49-F238E27FC236}">
+                <a16:creationId xmlns:a16="http://schemas.microsoft.com/office/drawing/2014/main" id="{26780B71-3C45-418E-886F-570A65BE1E60}"/>
+              </a:ext>
+            </a:extLst>
+          </p:cNvPr>
+          <p:cNvSpPr>
+            <a:spLocks noGrp="1"/>
+          </p:cNvSpPr>
+          <p:nvPr>
+            <p:ph type="title"/>
+          </p:nvPr>
+        </p:nvSpPr>
+        <p:spPr/>
+        <p:txBody>
+          <a:bodyPr/>
+          <a:lstStyle/>
+          <a:p>
+            <a:r>
+              <a:rPr lang="nl-NL" dirty="0"/>
+              <a:t>Application: </a:t>
+            </a:r>
+            <a:r>
+              <a:rPr lang="nl-NL" dirty="0" err="1"/>
+              <a:t>Stats</a:t>
+            </a:r>
+            <a:endParaRPr lang="nl-NL" dirty="0"/>
+          </a:p>
+        </p:txBody>
+      </p:sp>
+      <p:pic>
+        <p:nvPicPr>
+          <p:cNvPr id="7" name="Tijdelijke aanduiding voor inhoud 6">
+            <a:extLst>
+              <a:ext uri="{FF2B5EF4-FFF2-40B4-BE49-F238E27FC236}">
+                <a16:creationId xmlns:a16="http://schemas.microsoft.com/office/drawing/2014/main" id="{CA8BB1D5-C294-4374-A90B-4DF3199F9794}"/>
+              </a:ext>
+            </a:extLst>
+          </p:cNvPr>
+          <p:cNvPicPr>
+            <a:picLocks noGrp="1" noChangeAspect="1"/>
+          </p:cNvPicPr>
+          <p:nvPr>
+            <p:ph idx="1"/>
+          </p:nvPr>
+        </p:nvPicPr>
+        <p:blipFill>
+          <a:blip r:embed="rId2">
+            <a:extLst>
+              <a:ext uri="{28A0092B-C50C-407E-A947-70E740481C1C}">
+                <a14:useLocalDpi xmlns:a14="http://schemas.microsoft.com/office/drawing/2010/main" val="0"/>
+              </a:ext>
+            </a:extLst>
+          </a:blip>
+          <a:stretch>
+            <a:fillRect/>
+          </a:stretch>
+        </p:blipFill>
+        <p:spPr>
+          <a:xfrm>
+            <a:off x="3300678" y="1846263"/>
+            <a:ext cx="5650970" cy="4022724"/>
+          </a:xfrm>
+        </p:spPr>
+      </p:pic>
+    </p:spTree>
+    <p:extLst>
+      <p:ext uri="{BB962C8B-B14F-4D97-AF65-F5344CB8AC3E}">
+        <p14:creationId xmlns:p14="http://schemas.microsoft.com/office/powerpoint/2010/main" val="290353710"/>
+      </p:ext>
+    </p:extLst>
+  </p:cSld>
+  <p:clrMapOvr>
+    <a:masterClrMapping/>
+  </p:clrMapOvr>
+</p:sld>
+</file>
+
+<file path=ppt/slides/slide12.xml><?xml version="1.0" encoding="utf-8"?>
+<p:sld xmlns:a="http://schemas.openxmlformats.org/drawingml/2006/main" xmlns:r="http://schemas.openxmlformats.org/officeDocument/2006/relationships" xmlns:p="http://schemas.openxmlformats.org/presentationml/2006/main">
+  <p:cSld>
+    <p:spTree>
+      <p:nvGrpSpPr>
+        <p:cNvPr id="1" name=""/>
+        <p:cNvGrpSpPr/>
+        <p:nvPr/>
+      </p:nvGrpSpPr>
+      <p:grpSpPr>
+        <a:xfrm>
+          <a:off x="0" y="0"/>
+          <a:ext cx="0" cy="0"/>
+          <a:chOff x="0" y="0"/>
+          <a:chExt cx="0" cy="0"/>
+        </a:xfrm>
+      </p:grpSpPr>
+      <p:sp>
+        <p:nvSpPr>
+          <p:cNvPr id="2" name="Titel 1">
+            <a:extLst>
+              <a:ext uri="{FF2B5EF4-FFF2-40B4-BE49-F238E27FC236}">
                 <a16:creationId xmlns:a16="http://schemas.microsoft.com/office/drawing/2014/main" id="{EB3E916F-0ACC-46AA-928D-91263392B7C1}"/>
               </a:ext>
             </a:extLst>
@@ -4063,7 +4338,7 @@
 </p:sld>
 </file>
 
-<file path=ppt/slides/slide11.xml><?xml version="1.0" encoding="utf-8"?>
+<file path=ppt/slides/slide13.xml><?xml version="1.0" encoding="utf-8"?>
 <p:sld xmlns:a="http://schemas.openxmlformats.org/drawingml/2006/main" xmlns:r="http://schemas.openxmlformats.org/officeDocument/2006/relationships" xmlns:p="http://schemas.openxmlformats.org/presentationml/2006/main">
   <p:cSld>
     <p:spTree>
@@ -4161,7 +4436,7 @@
 </p:sld>
 </file>
 
-<file path=ppt/slides/slide12.xml><?xml version="1.0" encoding="utf-8"?>
+<file path=ppt/slides/slide14.xml><?xml version="1.0" encoding="utf-8"?>
 <p:sld xmlns:a="http://schemas.openxmlformats.org/drawingml/2006/main" xmlns:r="http://schemas.openxmlformats.org/officeDocument/2006/relationships" xmlns:p="http://schemas.openxmlformats.org/presentationml/2006/main">
   <p:cSld>
     <p:spTree>
@@ -4397,7 +4672,7 @@
 </p:sld>
 </file>
 
-<file path=ppt/slides/slide13.xml><?xml version="1.0" encoding="utf-8"?>
+<file path=ppt/slides/slide15.xml><?xml version="1.0" encoding="utf-8"?>
 <p:sld xmlns:a="http://schemas.openxmlformats.org/drawingml/2006/main" xmlns:r="http://schemas.openxmlformats.org/officeDocument/2006/relationships" xmlns:p="http://schemas.openxmlformats.org/presentationml/2006/main">
   <p:cSld>
     <p:spTree>
@@ -4909,6 +5184,99 @@
 </file>
 
 <file path=ppt/slides/slide4.xml><?xml version="1.0" encoding="utf-8"?>
+<p:sld xmlns:a="http://schemas.openxmlformats.org/drawingml/2006/main" xmlns:r="http://schemas.openxmlformats.org/officeDocument/2006/relationships" xmlns:p="http://schemas.openxmlformats.org/presentationml/2006/main">
+  <p:cSld>
+    <p:spTree>
+      <p:nvGrpSpPr>
+        <p:cNvPr id="1" name=""/>
+        <p:cNvGrpSpPr/>
+        <p:nvPr/>
+      </p:nvGrpSpPr>
+      <p:grpSpPr>
+        <a:xfrm>
+          <a:off x="0" y="0"/>
+          <a:ext cx="0" cy="0"/>
+          <a:chOff x="0" y="0"/>
+          <a:chExt cx="0" cy="0"/>
+        </a:xfrm>
+      </p:grpSpPr>
+      <p:sp>
+        <p:nvSpPr>
+          <p:cNvPr id="2" name="Titel 1">
+            <a:extLst>
+              <a:ext uri="{FF2B5EF4-FFF2-40B4-BE49-F238E27FC236}">
+                <a16:creationId xmlns:a16="http://schemas.microsoft.com/office/drawing/2014/main" id="{73B4DE65-F48B-41E6-872E-D7A5445B1BCC}"/>
+              </a:ext>
+            </a:extLst>
+          </p:cNvPr>
+          <p:cNvSpPr>
+            <a:spLocks noGrp="1"/>
+          </p:cNvSpPr>
+          <p:nvPr>
+            <p:ph type="title"/>
+          </p:nvPr>
+        </p:nvSpPr>
+        <p:spPr/>
+        <p:txBody>
+          <a:bodyPr/>
+          <a:lstStyle/>
+          <a:p>
+            <a:r>
+              <a:rPr lang="nl-NL" dirty="0"/>
+              <a:t>Application: Menu</a:t>
+            </a:r>
+          </a:p>
+        </p:txBody>
+      </p:sp>
+      <p:pic>
+        <p:nvPicPr>
+          <p:cNvPr id="5" name="Tijdelijke aanduiding voor inhoud 4">
+            <a:extLst>
+              <a:ext uri="{FF2B5EF4-FFF2-40B4-BE49-F238E27FC236}">
+                <a16:creationId xmlns:a16="http://schemas.microsoft.com/office/drawing/2014/main" id="{36576BB9-9E7A-47DD-AB40-E47A166EDD56}"/>
+              </a:ext>
+            </a:extLst>
+          </p:cNvPr>
+          <p:cNvPicPr>
+            <a:picLocks noGrp="1" noChangeAspect="1"/>
+          </p:cNvPicPr>
+          <p:nvPr>
+            <p:ph idx="1"/>
+          </p:nvPr>
+        </p:nvPicPr>
+        <p:blipFill>
+          <a:blip r:embed="rId2">
+            <a:extLst>
+              <a:ext uri="{28A0092B-C50C-407E-A947-70E740481C1C}">
+                <a14:useLocalDpi xmlns:a14="http://schemas.microsoft.com/office/drawing/2010/main" val="0"/>
+              </a:ext>
+            </a:extLst>
+          </a:blip>
+          <a:stretch>
+            <a:fillRect/>
+          </a:stretch>
+        </p:blipFill>
+        <p:spPr>
+          <a:xfrm>
+            <a:off x="3257062" y="1846263"/>
+            <a:ext cx="5738201" cy="4022725"/>
+          </a:xfrm>
+        </p:spPr>
+      </p:pic>
+    </p:spTree>
+    <p:extLst>
+      <p:ext uri="{BB962C8B-B14F-4D97-AF65-F5344CB8AC3E}">
+        <p14:creationId xmlns:p14="http://schemas.microsoft.com/office/powerpoint/2010/main" val="3077029332"/>
+      </p:ext>
+    </p:extLst>
+  </p:cSld>
+  <p:clrMapOvr>
+    <a:masterClrMapping/>
+  </p:clrMapOvr>
+</p:sld>
+</file>
+
+<file path=ppt/slides/slide5.xml><?xml version="1.0" encoding="utf-8"?>
 <p:sld xmlns:a="http://schemas.openxmlformats.org/drawingml/2006/main" xmlns:r="http://schemas.openxmlformats.org/officeDocument/2006/relationships" xmlns:p="http://schemas.openxmlformats.org/presentationml/2006/main">
   <p:cSld>
     <p:spTree>
@@ -5150,7 +5518,7 @@
 </p:sld>
 </file>
 
-<file path=ppt/slides/slide5.xml><?xml version="1.0" encoding="utf-8"?>
+<file path=ppt/slides/slide6.xml><?xml version="1.0" encoding="utf-8"?>
 <p:sld xmlns:a="http://schemas.openxmlformats.org/drawingml/2006/main" xmlns:r="http://schemas.openxmlformats.org/officeDocument/2006/relationships" xmlns:p="http://schemas.openxmlformats.org/presentationml/2006/main">
   <p:cSld>
     <p:spTree>
@@ -5333,7 +5701,7 @@
 </p:sld>
 </file>
 
-<file path=ppt/slides/slide6.xml><?xml version="1.0" encoding="utf-8"?>
+<file path=ppt/slides/slide7.xml><?xml version="1.0" encoding="utf-8"?>
 <p:sld xmlns:a="http://schemas.openxmlformats.org/drawingml/2006/main" xmlns:r="http://schemas.openxmlformats.org/officeDocument/2006/relationships" xmlns:p="http://schemas.openxmlformats.org/presentationml/2006/main">
   <p:cSld>
     <p:spTree>
@@ -5513,7 +5881,7 @@
 </p:sld>
 </file>
 
-<file path=ppt/slides/slide7.xml><?xml version="1.0" encoding="utf-8"?>
+<file path=ppt/slides/slide8.xml><?xml version="1.0" encoding="utf-8"?>
 <p:sld xmlns:a="http://schemas.openxmlformats.org/drawingml/2006/main" xmlns:r="http://schemas.openxmlformats.org/officeDocument/2006/relationships" xmlns:p="http://schemas.openxmlformats.org/presentationml/2006/main">
   <p:cSld>
     <p:spTree>
@@ -5616,6 +5984,9 @@
                     <p:cTn id="3" fill="hold">
                       <p:stCondLst>
                         <p:cond delay="indefinite"/>
+                        <p:cond evt="onBegin" delay="0">
+                          <p:tn val="2"/>
+                        </p:cond>
                       </p:stCondLst>
                       <p:childTnLst>
                         <p:par>
@@ -5625,7 +5996,7 @@
                             </p:stCondLst>
                             <p:childTnLst>
                               <p:par>
-                                <p:cTn id="5" presetID="1" presetClass="mediacall" presetSubtype="0" fill="hold" nodeType="clickEffect">
+                                <p:cTn id="5" presetID="1" presetClass="mediacall" presetSubtype="0" fill="hold" nodeType="afterEffect">
                                   <p:stCondLst>
                                     <p:cond delay="0"/>
                                   </p:stCondLst>
@@ -5633,240 +6004,6 @@
                                     <p:cmd type="call" cmd="playFrom(0.0)">
                                       <p:cBhvr>
                                         <p:cTn id="6" dur="21500" fill="hold"/>
-                                        <p:tgtEl>
-                                          <p:spTgt spid="4"/>
-                                        </p:tgtEl>
-                                      </p:cBhvr>
-                                    </p:cmd>
-                                  </p:childTnLst>
-                                </p:cTn>
-                              </p:par>
-                            </p:childTnLst>
-                          </p:cTn>
-                        </p:par>
-                      </p:childTnLst>
-                    </p:cTn>
-                  </p:par>
-                </p:childTnLst>
-              </p:cTn>
-              <p:prevCondLst>
-                <p:cond evt="onPrev" delay="0">
-                  <p:tgtEl>
-                    <p:sldTgt/>
-                  </p:tgtEl>
-                </p:cond>
-              </p:prevCondLst>
-              <p:nextCondLst>
-                <p:cond evt="onNext" delay="0">
-                  <p:tgtEl>
-                    <p:sldTgt/>
-                  </p:tgtEl>
-                </p:cond>
-              </p:nextCondLst>
-            </p:seq>
-            <p:video>
-              <p:cMediaNode vol="80000">
-                <p:cTn id="7" fill="hold" display="0">
-                  <p:stCondLst>
-                    <p:cond delay="indefinite"/>
-                  </p:stCondLst>
-                </p:cTn>
-                <p:tgtEl>
-                  <p:spTgt spid="4"/>
-                </p:tgtEl>
-              </p:cMediaNode>
-            </p:video>
-            <p:seq concurrent="1" nextAc="seek">
-              <p:cTn id="8" restart="whenNotActive" fill="hold" evtFilter="cancelBubble" nodeType="interactiveSeq">
-                <p:stCondLst>
-                  <p:cond evt="onClick" delay="0">
-                    <p:tgtEl>
-                      <p:spTgt spid="4"/>
-                    </p:tgtEl>
-                  </p:cond>
-                </p:stCondLst>
-                <p:endSync evt="end" delay="0">
-                  <p:rtn val="all"/>
-                </p:endSync>
-                <p:childTnLst>
-                  <p:par>
-                    <p:cTn id="9" fill="hold">
-                      <p:stCondLst>
-                        <p:cond delay="0"/>
-                      </p:stCondLst>
-                      <p:childTnLst>
-                        <p:par>
-                          <p:cTn id="10" fill="hold">
-                            <p:stCondLst>
-                              <p:cond delay="0"/>
-                            </p:stCondLst>
-                            <p:childTnLst>
-                              <p:par>
-                                <p:cTn id="11" presetID="2" presetClass="mediacall" presetSubtype="0" fill="hold" nodeType="clickEffect">
-                                  <p:stCondLst>
-                                    <p:cond delay="0"/>
-                                  </p:stCondLst>
-                                  <p:childTnLst>
-                                    <p:cmd type="call" cmd="togglePause">
-                                      <p:cBhvr>
-                                        <p:cTn id="12" dur="1" fill="hold"/>
-                                        <p:tgtEl>
-                                          <p:spTgt spid="4"/>
-                                        </p:tgtEl>
-                                      </p:cBhvr>
-                                    </p:cmd>
-                                  </p:childTnLst>
-                                </p:cTn>
-                              </p:par>
-                            </p:childTnLst>
-                          </p:cTn>
-                        </p:par>
-                      </p:childTnLst>
-                    </p:cTn>
-                  </p:par>
-                </p:childTnLst>
-              </p:cTn>
-              <p:nextCondLst>
-                <p:cond evt="onClick" delay="0">
-                  <p:tgtEl>
-                    <p:spTgt spid="4"/>
-                  </p:tgtEl>
-                </p:cond>
-              </p:nextCondLst>
-            </p:seq>
-          </p:childTnLst>
-        </p:cTn>
-      </p:par>
-    </p:tnLst>
-  </p:timing>
-</p:sld>
-</file>
-
-<file path=ppt/slides/slide8.xml><?xml version="1.0" encoding="utf-8"?>
-<p:sld xmlns:a="http://schemas.openxmlformats.org/drawingml/2006/main" xmlns:r="http://schemas.openxmlformats.org/officeDocument/2006/relationships" xmlns:p="http://schemas.openxmlformats.org/presentationml/2006/main">
-  <p:cSld>
-    <p:spTree>
-      <p:nvGrpSpPr>
-        <p:cNvPr id="1" name=""/>
-        <p:cNvGrpSpPr/>
-        <p:nvPr/>
-      </p:nvGrpSpPr>
-      <p:grpSpPr>
-        <a:xfrm>
-          <a:off x="0" y="0"/>
-          <a:ext cx="0" cy="0"/>
-          <a:chOff x="0" y="0"/>
-          <a:chExt cx="0" cy="0"/>
-        </a:xfrm>
-      </p:grpSpPr>
-      <p:sp>
-        <p:nvSpPr>
-          <p:cNvPr id="2" name="Titel 1">
-            <a:extLst>
-              <a:ext uri="{FF2B5EF4-FFF2-40B4-BE49-F238E27FC236}">
-                <a16:creationId xmlns:a16="http://schemas.microsoft.com/office/drawing/2014/main" id="{26780B71-3C45-418E-886F-570A65BE1E60}"/>
-              </a:ext>
-            </a:extLst>
-          </p:cNvPr>
-          <p:cNvSpPr>
-            <a:spLocks noGrp="1"/>
-          </p:cNvSpPr>
-          <p:nvPr>
-            <p:ph type="title"/>
-          </p:nvPr>
-        </p:nvSpPr>
-        <p:spPr/>
-        <p:txBody>
-          <a:bodyPr/>
-          <a:lstStyle/>
-          <a:p>
-            <a:r>
-              <a:rPr lang="nl-NL" dirty="0"/>
-              <a:t>Application: </a:t>
-            </a:r>
-            <a:r>
-              <a:rPr lang="nl-NL" dirty="0" err="1"/>
-              <a:t>Temperature</a:t>
-            </a:r>
-            <a:endParaRPr lang="nl-NL" dirty="0"/>
-          </a:p>
-        </p:txBody>
-      </p:sp>
-      <p:pic>
-        <p:nvPicPr>
-          <p:cNvPr id="4" name="temperature">
-            <a:hlinkClick r:id="" action="ppaction://media"/>
-            <a:extLst>
-              <a:ext uri="{FF2B5EF4-FFF2-40B4-BE49-F238E27FC236}">
-                <a16:creationId xmlns:a16="http://schemas.microsoft.com/office/drawing/2014/main" id="{2A3B4847-D691-4A5E-BEC6-5EC7637C9A72}"/>
-              </a:ext>
-            </a:extLst>
-          </p:cNvPr>
-          <p:cNvPicPr>
-            <a:picLocks noGrp="1" noChangeAspect="1"/>
-          </p:cNvPicPr>
-          <p:nvPr>
-            <p:ph idx="1"/>
-            <a:videoFile r:link="rId2"/>
-            <p:extLst>
-              <p:ext uri="{DAA4B4D4-6D71-4841-9C94-3DE7FCFB9230}">
-                <p14:media xmlns:p14="http://schemas.microsoft.com/office/powerpoint/2010/main" r:embed="rId1"/>
-              </p:ext>
-            </p:extLst>
-          </p:nvPr>
-        </p:nvPicPr>
-        <p:blipFill>
-          <a:blip r:embed="rId4"/>
-          <a:stretch>
-            <a:fillRect/>
-          </a:stretch>
-        </p:blipFill>
-        <p:spPr>
-          <a:xfrm>
-            <a:off x="3279775" y="1846263"/>
-            <a:ext cx="5692775" cy="4022725"/>
-          </a:xfrm>
-        </p:spPr>
-      </p:pic>
-    </p:spTree>
-    <p:extLst>
-      <p:ext uri="{BB962C8B-B14F-4D97-AF65-F5344CB8AC3E}">
-        <p14:creationId xmlns:p14="http://schemas.microsoft.com/office/powerpoint/2010/main" val="885905204"/>
-      </p:ext>
-    </p:extLst>
-  </p:cSld>
-  <p:clrMapOvr>
-    <a:masterClrMapping/>
-  </p:clrMapOvr>
-  <p:timing>
-    <p:tnLst>
-      <p:par>
-        <p:cTn id="1" dur="indefinite" restart="never" nodeType="tmRoot">
-          <p:childTnLst>
-            <p:seq concurrent="1" nextAc="seek">
-              <p:cTn id="2" dur="indefinite" nodeType="mainSeq">
-                <p:childTnLst>
-                  <p:par>
-                    <p:cTn id="3" fill="hold">
-                      <p:stCondLst>
-                        <p:cond delay="indefinite"/>
-                      </p:stCondLst>
-                      <p:childTnLst>
-                        <p:par>
-                          <p:cTn id="4" fill="hold">
-                            <p:stCondLst>
-                              <p:cond delay="0"/>
-                            </p:stCondLst>
-                            <p:childTnLst>
-                              <p:par>
-                                <p:cTn id="5" presetID="1" presetClass="mediacall" presetSubtype="0" fill="hold" nodeType="clickEffect">
-                                  <p:stCondLst>
-                                    <p:cond delay="0"/>
-                                  </p:stCondLst>
-                                  <p:childTnLst>
-                                    <p:cmd type="call" cmd="playFrom(0.0)">
-                                      <p:cBhvr>
-                                        <p:cTn id="6" dur="28400" fill="hold"/>
                                         <p:tgtEl>
                                           <p:spTgt spid="4"/>
                                         </p:tgtEl>
@@ -6020,7 +6157,7 @@
             </a:r>
             <a:r>
               <a:rPr lang="nl-NL" dirty="0" err="1"/>
-              <a:t>Stats</a:t>
+              <a:t>Temperature</a:t>
             </a:r>
             <a:endParaRPr lang="nl-NL" dirty="0"/>
           </a:p>
@@ -6028,10 +6165,11 @@
       </p:sp>
       <p:pic>
         <p:nvPicPr>
-          <p:cNvPr id="7" name="Tijdelijke aanduiding voor inhoud 6">
+          <p:cNvPr id="4" name="temperature">
+            <a:hlinkClick r:id="" action="ppaction://media"/>
             <a:extLst>
               <a:ext uri="{FF2B5EF4-FFF2-40B4-BE49-F238E27FC236}">
-                <a16:creationId xmlns:a16="http://schemas.microsoft.com/office/drawing/2014/main" id="{CA8BB1D5-C294-4374-A90B-4DF3199F9794}"/>
+                <a16:creationId xmlns:a16="http://schemas.microsoft.com/office/drawing/2014/main" id="{2A3B4847-D691-4A5E-BEC6-5EC7637C9A72}"/>
               </a:ext>
             </a:extLst>
           </p:cNvPr>
@@ -6040,37 +6178,175 @@
           </p:cNvPicPr>
           <p:nvPr>
             <p:ph idx="1"/>
+            <a:videoFile r:link="rId2"/>
+            <p:extLst>
+              <p:ext uri="{DAA4B4D4-6D71-4841-9C94-3DE7FCFB9230}">
+                <p14:media xmlns:p14="http://schemas.microsoft.com/office/powerpoint/2010/main" r:embed="rId1"/>
+              </p:ext>
+            </p:extLst>
           </p:nvPr>
         </p:nvPicPr>
         <p:blipFill>
-          <a:blip r:embed="rId2">
-            <a:extLst>
-              <a:ext uri="{28A0092B-C50C-407E-A947-70E740481C1C}">
-                <a14:useLocalDpi xmlns:a14="http://schemas.microsoft.com/office/drawing/2010/main" val="0"/>
-              </a:ext>
-            </a:extLst>
-          </a:blip>
+          <a:blip r:embed="rId4"/>
           <a:stretch>
             <a:fillRect/>
           </a:stretch>
         </p:blipFill>
         <p:spPr>
           <a:xfrm>
-            <a:off x="3300678" y="1846263"/>
-            <a:ext cx="5650970" cy="4022724"/>
+            <a:off x="3279775" y="1846263"/>
+            <a:ext cx="5692775" cy="4022725"/>
           </a:xfrm>
         </p:spPr>
       </p:pic>
     </p:spTree>
     <p:extLst>
       <p:ext uri="{BB962C8B-B14F-4D97-AF65-F5344CB8AC3E}">
-        <p14:creationId xmlns:p14="http://schemas.microsoft.com/office/powerpoint/2010/main" val="290353710"/>
+        <p14:creationId xmlns:p14="http://schemas.microsoft.com/office/powerpoint/2010/main" val="885905204"/>
       </p:ext>
     </p:extLst>
   </p:cSld>
   <p:clrMapOvr>
     <a:masterClrMapping/>
   </p:clrMapOvr>
+  <p:timing>
+    <p:tnLst>
+      <p:par>
+        <p:cTn id="1" dur="indefinite" restart="never" nodeType="tmRoot">
+          <p:childTnLst>
+            <p:seq concurrent="1" nextAc="seek">
+              <p:cTn id="2" dur="indefinite" nodeType="mainSeq">
+                <p:childTnLst>
+                  <p:par>
+                    <p:cTn id="3" fill="hold">
+                      <p:stCondLst>
+                        <p:cond delay="indefinite"/>
+                        <p:cond evt="onBegin" delay="0">
+                          <p:tn val="2"/>
+                        </p:cond>
+                      </p:stCondLst>
+                      <p:childTnLst>
+                        <p:par>
+                          <p:cTn id="4" fill="hold">
+                            <p:stCondLst>
+                              <p:cond delay="0"/>
+                            </p:stCondLst>
+                            <p:childTnLst>
+                              <p:par>
+                                <p:cTn id="5" presetID="1" presetClass="mediacall" presetSubtype="0" fill="hold" nodeType="afterEffect">
+                                  <p:stCondLst>
+                                    <p:cond delay="0"/>
+                                  </p:stCondLst>
+                                  <p:childTnLst>
+                                    <p:cmd type="call" cmd="playFrom(0.0)">
+                                      <p:cBhvr>
+                                        <p:cTn id="6" dur="28400" fill="hold"/>
+                                        <p:tgtEl>
+                                          <p:spTgt spid="4"/>
+                                        </p:tgtEl>
+                                      </p:cBhvr>
+                                    </p:cmd>
+                                  </p:childTnLst>
+                                </p:cTn>
+                              </p:par>
+                            </p:childTnLst>
+                          </p:cTn>
+                        </p:par>
+                      </p:childTnLst>
+                    </p:cTn>
+                  </p:par>
+                </p:childTnLst>
+              </p:cTn>
+              <p:prevCondLst>
+                <p:cond evt="onPrev" delay="0">
+                  <p:tgtEl>
+                    <p:sldTgt/>
+                  </p:tgtEl>
+                </p:cond>
+              </p:prevCondLst>
+              <p:nextCondLst>
+                <p:cond evt="onNext" delay="0">
+                  <p:tgtEl>
+                    <p:sldTgt/>
+                  </p:tgtEl>
+                </p:cond>
+              </p:nextCondLst>
+            </p:seq>
+            <p:video>
+              <p:cMediaNode vol="80000">
+                <p:cTn id="7" fill="hold" display="0">
+                  <p:stCondLst>
+                    <p:cond delay="indefinite"/>
+                  </p:stCondLst>
+                </p:cTn>
+                <p:tgtEl>
+                  <p:spTgt spid="4"/>
+                </p:tgtEl>
+              </p:cMediaNode>
+            </p:video>
+            <p:seq concurrent="1" nextAc="seek">
+              <p:cTn id="8" restart="whenNotActive" fill="hold" evtFilter="cancelBubble" nodeType="interactiveSeq">
+                <p:stCondLst>
+                  <p:cond evt="onClick" delay="0">
+                    <p:tgtEl>
+                      <p:spTgt spid="4"/>
+                    </p:tgtEl>
+                  </p:cond>
+                </p:stCondLst>
+                <p:endSync evt="end" delay="0">
+                  <p:rtn val="all"/>
+                </p:endSync>
+                <p:childTnLst>
+                  <p:par>
+                    <p:cTn id="9" fill="hold">
+                      <p:stCondLst>
+                        <p:cond delay="0"/>
+                      </p:stCondLst>
+                      <p:childTnLst>
+                        <p:par>
+                          <p:cTn id="10" fill="hold">
+                            <p:stCondLst>
+                              <p:cond delay="0"/>
+                            </p:stCondLst>
+                            <p:childTnLst>
+                              <p:par>
+                                <p:cTn id="11" presetID="2" presetClass="mediacall" presetSubtype="0" fill="hold" nodeType="clickEffect">
+                                  <p:stCondLst>
+                                    <p:cond delay="0"/>
+                                  </p:stCondLst>
+                                  <p:childTnLst>
+                                    <p:cmd type="call" cmd="togglePause">
+                                      <p:cBhvr>
+                                        <p:cTn id="12" dur="1" fill="hold"/>
+                                        <p:tgtEl>
+                                          <p:spTgt spid="4"/>
+                                        </p:tgtEl>
+                                      </p:cBhvr>
+                                    </p:cmd>
+                                  </p:childTnLst>
+                                </p:cTn>
+                              </p:par>
+                            </p:childTnLst>
+                          </p:cTn>
+                        </p:par>
+                      </p:childTnLst>
+                    </p:cTn>
+                  </p:par>
+                </p:childTnLst>
+              </p:cTn>
+              <p:nextCondLst>
+                <p:cond evt="onClick" delay="0">
+                  <p:tgtEl>
+                    <p:spTgt spid="4"/>
+                  </p:tgtEl>
+                </p:cond>
+              </p:nextCondLst>
+            </p:seq>
+          </p:childTnLst>
+        </p:cTn>
+      </p:par>
+    </p:tnLst>
+  </p:timing>
 </p:sld>
 </file>
 

</xml_diff>